<commit_message>
todas as tabelas inseridas
</commit_message>
<xml_diff>
--- a/Documentacao/ModelagemSistema_TemplateInicial.pptx
+++ b/Documentacao/ModelagemSistema_TemplateInicial.pptx
@@ -222,7 +222,7 @@
           <a:p>
             <a:fld id="{93DDA81E-B6DD-4CA0-9C2D-B0C27B95DC2C}" type="datetimeFigureOut">
               <a:rPr lang="pt-BR" smtClean="0"/>
-              <a:t>12/02/2025</a:t>
+              <a:t>13/02/2025</a:t>
             </a:fld>
             <a:endParaRPr lang="pt-BR"/>
           </a:p>
@@ -2570,7 +2570,7 @@
           <a:p>
             <a:fld id="{C128FA71-3A18-48C0-980F-4B68F7F63042}" type="datetime1">
               <a:rPr lang="en-US" smtClean="0"/>
-              <a:t>2/12/2025</a:t>
+              <a:t>2/13/2025</a:t>
             </a:fld>
             <a:endParaRPr lang="en-US"/>
           </a:p>
@@ -2778,7 +2778,7 @@
           <a:p>
             <a:fld id="{7104EDB3-C0E8-45F8-9E1D-1B6C8D1880C0}" type="datetime1">
               <a:rPr lang="en-US" smtClean="0"/>
-              <a:t>2/12/2025</a:t>
+              <a:t>2/13/2025</a:t>
             </a:fld>
             <a:endParaRPr lang="en-US"/>
           </a:p>
@@ -2988,7 +2988,7 @@
           <a:p>
             <a:fld id="{9CF0EC4B-54ED-4041-B552-9BA760FA3DBA}" type="datetime1">
               <a:rPr lang="en-US" smtClean="0"/>
-              <a:t>2/12/2025</a:t>
+              <a:t>2/13/2025</a:t>
             </a:fld>
             <a:endParaRPr lang="en-US"/>
           </a:p>
@@ -3186,7 +3186,7 @@
           <a:p>
             <a:fld id="{51C1210E-201E-4473-82AC-2466F5386C38}" type="datetime1">
               <a:rPr lang="en-US" smtClean="0"/>
-              <a:t>2/12/2025</a:t>
+              <a:t>2/13/2025</a:t>
             </a:fld>
             <a:endParaRPr lang="en-US"/>
           </a:p>
@@ -3464,7 +3464,7 @@
           <a:p>
             <a:fld id="{B01EA198-6CAB-4B8F-B93F-1F9C8C4B6CE7}" type="datetime1">
               <a:rPr lang="en-US" smtClean="0"/>
-              <a:t>2/12/2025</a:t>
+              <a:t>2/13/2025</a:t>
             </a:fld>
             <a:endParaRPr lang="en-US"/>
           </a:p>
@@ -3736,7 +3736,7 @@
           <a:p>
             <a:fld id="{CA06041F-4525-44D5-AA4F-332294BF1F56}" type="datetime1">
               <a:rPr lang="en-US" smtClean="0"/>
-              <a:t>2/12/2025</a:t>
+              <a:t>2/13/2025</a:t>
             </a:fld>
             <a:endParaRPr lang="en-US"/>
           </a:p>
@@ -4160,7 +4160,7 @@
           <a:p>
             <a:fld id="{F9557091-BBDF-4EB9-BA6B-2BB67AC4FC0F}" type="datetime1">
               <a:rPr lang="en-US" smtClean="0"/>
-              <a:t>2/12/2025</a:t>
+              <a:t>2/13/2025</a:t>
             </a:fld>
             <a:endParaRPr lang="en-US"/>
           </a:p>
@@ -4301,7 +4301,7 @@
           <a:p>
             <a:fld id="{2D6B226B-77A6-410C-9796-083F278E0125}" type="datetime1">
               <a:rPr lang="en-US" smtClean="0"/>
-              <a:t>2/12/2025</a:t>
+              <a:t>2/13/2025</a:t>
             </a:fld>
             <a:endParaRPr lang="en-US"/>
           </a:p>
@@ -4414,7 +4414,7 @@
           <a:p>
             <a:fld id="{A23A578B-D289-4C40-8593-3D356C49DA58}" type="datetime1">
               <a:rPr lang="en-US" smtClean="0"/>
-              <a:t>2/12/2025</a:t>
+              <a:t>2/13/2025</a:t>
             </a:fld>
             <a:endParaRPr lang="en-US"/>
           </a:p>
@@ -4733,7 +4733,7 @@
           <a:p>
             <a:fld id="{713DFAE3-14DB-48A7-A80F-80DDB072CE3D}" type="datetime1">
               <a:rPr lang="en-US" smtClean="0"/>
-              <a:t>2/12/2025</a:t>
+              <a:t>2/13/2025</a:t>
             </a:fld>
             <a:endParaRPr lang="en-US"/>
           </a:p>
@@ -5027,7 +5027,7 @@
           <a:p>
             <a:fld id="{92C5EAEF-6478-4102-8F5D-A5FE9FC97ACB}" type="datetime1">
               <a:rPr lang="en-US" smtClean="0"/>
-              <a:t>2/12/2025</a:t>
+              <a:t>2/13/2025</a:t>
             </a:fld>
             <a:endParaRPr lang="en-US"/>
           </a:p>
@@ -5268,7 +5268,7 @@
           <a:p>
             <a:fld id="{67F45AC6-C491-4585-A584-9CE2AF7D5500}" type="datetime1">
               <a:rPr lang="en-US" smtClean="0"/>
-              <a:t>2/12/2025</a:t>
+              <a:t>2/13/2025</a:t>
             </a:fld>
             <a:endParaRPr lang="en-US"/>
           </a:p>
@@ -5698,7 +5698,7 @@
                 <a16:creationId xmlns:a16="http://schemas.microsoft.com/office/drawing/2014/main" id="{6E448DB1-4196-18A6-15DA-C72635C1B11E}"/>
               </a:ext>
               <a:ext uri="{C183D7F6-B498-43B3-948B-1728B52AA6E4}">
-                <adec:decorative xmlns="" xmlns:adec="http://schemas.microsoft.com/office/drawing/2017/decorative" val="1"/>
+                <adec:decorative xmlns:adec="http://schemas.microsoft.com/office/drawing/2017/decorative" xmlns="" val="1"/>
               </a:ext>
             </a:extLst>
           </p:cNvPr>
@@ -5806,7 +5806,7 @@
                 <a16:creationId xmlns:a16="http://schemas.microsoft.com/office/drawing/2014/main" id="{76A10D8F-D463-70E5-239B-17AD65EF433D}"/>
               </a:ext>
               <a:ext uri="{C183D7F6-B498-43B3-948B-1728B52AA6E4}">
-                <adec:decorative xmlns="" xmlns:adec="http://schemas.microsoft.com/office/drawing/2017/decorative" val="1"/>
+                <adec:decorative xmlns:adec="http://schemas.microsoft.com/office/drawing/2017/decorative" xmlns="" val="1"/>
               </a:ext>
             </a:extLst>
           </p:cNvPr>
@@ -6272,7 +6272,7 @@
                 <a16:creationId xmlns:a16="http://schemas.microsoft.com/office/drawing/2014/main" id="{74EA76C7-8C08-E029-0E79-750B71C94A62}"/>
               </a:ext>
               <a:ext uri="{C183D7F6-B498-43B3-948B-1728B52AA6E4}">
-                <adec:decorative xmlns="" xmlns:adec="http://schemas.microsoft.com/office/drawing/2017/decorative" val="1"/>
+                <adec:decorative xmlns:adec="http://schemas.microsoft.com/office/drawing/2017/decorative" xmlns="" val="1"/>
               </a:ext>
             </a:extLst>
           </p:cNvPr>
@@ -6411,7 +6411,7 @@
             <p:ph sz="half" idx="2"/>
             <p:extLst>
               <p:ext uri="{E7BDC344-281C-4309-B0C6-D0EE65EED2A8}">
-                <p202:designPr xmlns="" xmlns:p202="http://schemas.microsoft.com/office/powerpoint/2020/02/main">
+                <p202:designPr xmlns:p202="http://schemas.microsoft.com/office/powerpoint/2020/02/main" xmlns="">
                   <p202:designTagLst>
                     <p202:designTag name="ARCH:1:CLS" val="InformationBlock"/>
                     <p202:designTag name="ARCH:1:VSVAR" val="TitledTextBox"/>
@@ -6707,7 +6707,7 @@
                 <a16:creationId xmlns:a16="http://schemas.microsoft.com/office/drawing/2014/main" id="{74EA76C7-8C08-E029-0E79-750B71C94A62}"/>
               </a:ext>
               <a:ext uri="{C183D7F6-B498-43B3-948B-1728B52AA6E4}">
-                <adec:decorative xmlns="" xmlns:adec="http://schemas.microsoft.com/office/drawing/2017/decorative" val="1"/>
+                <adec:decorative xmlns:adec="http://schemas.microsoft.com/office/drawing/2017/decorative" xmlns="" val="1"/>
               </a:ext>
             </a:extLst>
           </p:cNvPr>
@@ -7384,7 +7384,7 @@
                 <a16:creationId xmlns:a16="http://schemas.microsoft.com/office/drawing/2014/main" id="{5E8D3B17-7638-DFD3-18E4-8A6D611749CF}"/>
               </a:ext>
               <a:ext uri="{C183D7F6-B498-43B3-948B-1728B52AA6E4}">
-                <adec:decorative xmlns="" xmlns:adec="http://schemas.microsoft.com/office/drawing/2017/decorative" val="1"/>
+                <adec:decorative xmlns:adec="http://schemas.microsoft.com/office/drawing/2017/decorative" xmlns="" val="1"/>
               </a:ext>
             </a:extLst>
           </p:cNvPr>
@@ -10138,7 +10138,7 @@
                 <a16:creationId xmlns:a16="http://schemas.microsoft.com/office/drawing/2014/main" id="{B8ADE68D-5E75-5D63-4B8C-6BEFCE9D06E3}"/>
               </a:ext>
               <a:ext uri="{C183D7F6-B498-43B3-948B-1728B52AA6E4}">
-                <adec:decorative xmlns="" xmlns:adec="http://schemas.microsoft.com/office/drawing/2017/decorative" val="1"/>
+                <adec:decorative xmlns:adec="http://schemas.microsoft.com/office/drawing/2017/decorative" xmlns="" val="1"/>
               </a:ext>
             </a:extLst>
           </p:cNvPr>
@@ -11499,7 +11499,7 @@
                 <a16:creationId xmlns:a16="http://schemas.microsoft.com/office/drawing/2014/main" id="{8450EF29-A29A-9417-2B09-074C04064425}"/>
               </a:ext>
               <a:ext uri="{C183D7F6-B498-43B3-948B-1728B52AA6E4}">
-                <adec:decorative xmlns="" xmlns:adec="http://schemas.microsoft.com/office/drawing/2017/decorative" val="1"/>
+                <adec:decorative xmlns:adec="http://schemas.microsoft.com/office/drawing/2017/decorative" xmlns="" val="1"/>
               </a:ext>
             </a:extLst>
           </p:cNvPr>
@@ -12208,7 +12208,7 @@
                 <a16:creationId xmlns:a16="http://schemas.microsoft.com/office/drawing/2014/main" id="{8450EF29-A29A-9417-2B09-074C04064425}"/>
               </a:ext>
               <a:ext uri="{C183D7F6-B498-43B3-948B-1728B52AA6E4}">
-                <adec:decorative xmlns="" xmlns:adec="http://schemas.microsoft.com/office/drawing/2017/decorative" val="1"/>
+                <adec:decorative xmlns:adec="http://schemas.microsoft.com/office/drawing/2017/decorative" xmlns="" val="1"/>
               </a:ext>
             </a:extLst>
           </p:cNvPr>
@@ -14317,7 +14317,7 @@
                 <a16:creationId xmlns:a16="http://schemas.microsoft.com/office/drawing/2014/main" id="{5E8D3B17-7638-DFD3-18E4-8A6D611749CF}"/>
               </a:ext>
               <a:ext uri="{C183D7F6-B498-43B3-948B-1728B52AA6E4}">
-                <adec:decorative xmlns="" xmlns:adec="http://schemas.microsoft.com/office/drawing/2017/decorative" val="1"/>
+                <adec:decorative xmlns:adec="http://schemas.microsoft.com/office/drawing/2017/decorative" xmlns="" val="1"/>
               </a:ext>
             </a:extLst>
           </p:cNvPr>
@@ -14526,7 +14526,7 @@
             <p:ph sz="half" idx="2"/>
             <p:extLst>
               <p:ext uri="{E7BDC344-281C-4309-B0C6-D0EE65EED2A8}">
-                <p202:designPr xmlns="" xmlns:p202="http://schemas.microsoft.com/office/powerpoint/2020/02/main">
+                <p202:designPr xmlns:p202="http://schemas.microsoft.com/office/powerpoint/2020/02/main" xmlns="">
                   <p202:designTagLst>
                     <p202:designTag name="ARCH:1:CLS" val="InformationBlock"/>
                     <p202:designTag name="ARCH:1:VSVAR" val="TitledTextBox"/>
@@ -15049,7 +15049,6 @@
                         <a:rPr lang="pt-BR" dirty="0" smtClean="0"/>
                         <a:t>Quantidade</a:t>
                       </a:r>
-                      <a:endParaRPr lang="pt-BR" dirty="0" smtClean="0"/>
                     </a:p>
                   </a:txBody>
                   <a:tcPr/>
@@ -15094,7 +15093,6 @@
                         <a:rPr lang="pt-BR" dirty="0" smtClean="0"/>
                         <a:t>Preço</a:t>
                       </a:r>
-                      <a:endParaRPr lang="pt-BR" dirty="0" smtClean="0"/>
                     </a:p>
                   </a:txBody>
                   <a:tcPr/>
@@ -15139,7 +15137,6 @@
                         <a:rPr lang="pt-BR" dirty="0" smtClean="0"/>
                         <a:t>Total</a:t>
                       </a:r>
-                      <a:endParaRPr lang="pt-BR" dirty="0" smtClean="0"/>
                     </a:p>
                   </a:txBody>
                   <a:tcPr/>
@@ -16252,7 +16249,7 @@
                 <a16:creationId xmlns:a16="http://schemas.microsoft.com/office/drawing/2014/main" id="{5E8D3B17-7638-DFD3-18E4-8A6D611749CF}"/>
               </a:ext>
               <a:ext uri="{C183D7F6-B498-43B3-948B-1728B52AA6E4}">
-                <adec:decorative xmlns="" xmlns:adec="http://schemas.microsoft.com/office/drawing/2017/decorative" val="1"/>
+                <adec:decorative xmlns:adec="http://schemas.microsoft.com/office/drawing/2017/decorative" xmlns="" val="1"/>
               </a:ext>
             </a:extLst>
           </p:cNvPr>
@@ -16412,7 +16409,7 @@
                 <a16:creationId xmlns:a16="http://schemas.microsoft.com/office/drawing/2014/main" id="{5E8D3B17-7638-DFD3-18E4-8A6D611749CF}"/>
               </a:ext>
               <a:ext uri="{C183D7F6-B498-43B3-948B-1728B52AA6E4}">
-                <adec:decorative xmlns="" xmlns:adec="http://schemas.microsoft.com/office/drawing/2017/decorative" val="1"/>
+                <adec:decorative xmlns:adec="http://schemas.microsoft.com/office/drawing/2017/decorative" xmlns="" val="1"/>
               </a:ext>
             </a:extLst>
           </p:cNvPr>
@@ -16656,7 +16653,7 @@
                 <a16:creationId xmlns:a16="http://schemas.microsoft.com/office/drawing/2014/main" id="{5E8D3B17-7638-DFD3-18E4-8A6D611749CF}"/>
               </a:ext>
               <a:ext uri="{C183D7F6-B498-43B3-948B-1728B52AA6E4}">
-                <adec:decorative xmlns="" xmlns:adec="http://schemas.microsoft.com/office/drawing/2017/decorative" val="1"/>
+                <adec:decorative xmlns:adec="http://schemas.microsoft.com/office/drawing/2017/decorative" xmlns="" val="1"/>
               </a:ext>
             </a:extLst>
           </p:cNvPr>
@@ -17523,7 +17520,7 @@
                 <a16:creationId xmlns:a16="http://schemas.microsoft.com/office/drawing/2014/main" id="{5E8D3B17-7638-DFD3-18E4-8A6D611749CF}"/>
               </a:ext>
               <a:ext uri="{C183D7F6-B498-43B3-948B-1728B52AA6E4}">
-                <adec:decorative xmlns="" xmlns:adec="http://schemas.microsoft.com/office/drawing/2017/decorative" val="1"/>
+                <adec:decorative xmlns:adec="http://schemas.microsoft.com/office/drawing/2017/decorative" xmlns="" val="1"/>
               </a:ext>
             </a:extLst>
           </p:cNvPr>
@@ -17660,7 +17657,7 @@
             <p:ph sz="half" idx="2"/>
             <p:extLst>
               <p:ext uri="{E7BDC344-281C-4309-B0C6-D0EE65EED2A8}">
-                <p202:designPr xmlns="" xmlns:p202="http://schemas.microsoft.com/office/powerpoint/2020/02/main">
+                <p202:designPr xmlns:p202="http://schemas.microsoft.com/office/powerpoint/2020/02/main" xmlns="">
                   <p202:designTagLst>
                     <p202:designTag name="ARCH:1:CLS" val="InformationBlock"/>
                     <p202:designTag name="ARCH:1:VSVAR" val="TitledTextBox"/>
@@ -17886,7 +17883,7 @@
                 <a16:creationId xmlns:a16="http://schemas.microsoft.com/office/drawing/2014/main" id="{5E8D3B17-7638-DFD3-18E4-8A6D611749CF}"/>
               </a:ext>
               <a:ext uri="{C183D7F6-B498-43B3-948B-1728B52AA6E4}">
-                <adec:decorative xmlns="" xmlns:adec="http://schemas.microsoft.com/office/drawing/2017/decorative" val="1"/>
+                <adec:decorative xmlns:adec="http://schemas.microsoft.com/office/drawing/2017/decorative" xmlns="" val="1"/>
               </a:ext>
             </a:extLst>
           </p:cNvPr>
@@ -18013,7 +18010,7 @@
             <p:ph sz="half" idx="2"/>
             <p:extLst>
               <p:ext uri="{E7BDC344-281C-4309-B0C6-D0EE65EED2A8}">
-                <p202:designPr xmlns="" xmlns:p202="http://schemas.microsoft.com/office/powerpoint/2020/02/main">
+                <p202:designPr xmlns:p202="http://schemas.microsoft.com/office/powerpoint/2020/02/main" xmlns="">
                   <p202:designTagLst>
                     <p202:designTag name="ARCH:1:CLS" val="InformationBlock"/>
                     <p202:designTag name="ARCH:1:VSVAR" val="TitledTextBox"/>
@@ -18330,7 +18327,7 @@
                 <a16:creationId xmlns:a16="http://schemas.microsoft.com/office/drawing/2014/main" id="{E1D40FB4-97DC-F5FF-9E7A-C10E078A1532}"/>
               </a:ext>
               <a:ext uri="{C183D7F6-B498-43B3-948B-1728B52AA6E4}">
-                <adec:decorative xmlns="" xmlns:adec="http://schemas.microsoft.com/office/drawing/2017/decorative" val="1"/>
+                <adec:decorative xmlns:adec="http://schemas.microsoft.com/office/drawing/2017/decorative" xmlns="" val="1"/>
               </a:ext>
             </a:extLst>
           </p:cNvPr>
@@ -18460,7 +18457,7 @@
             <p:ph sz="half" idx="2"/>
             <p:extLst>
               <p:ext uri="{E7BDC344-281C-4309-B0C6-D0EE65EED2A8}">
-                <p202:designPr xmlns="" xmlns:p202="http://schemas.microsoft.com/office/powerpoint/2020/02/main">
+                <p202:designPr xmlns:p202="http://schemas.microsoft.com/office/powerpoint/2020/02/main" xmlns="">
                   <p202:designTagLst>
                     <p202:designTag name="ARCH:1:CLS" val="InformationBlock"/>
                     <p202:designTag name="ARCH:1:VSVAR" val="TitledTextBox"/>
@@ -18718,7 +18715,7 @@
                 <a16:creationId xmlns:a16="http://schemas.microsoft.com/office/drawing/2014/main" id="{A51D6A68-C3BD-3399-CCA8-A7290FC8E09C}"/>
               </a:ext>
               <a:ext uri="{C183D7F6-B498-43B3-948B-1728B52AA6E4}">
-                <adec:decorative xmlns="" xmlns:adec="http://schemas.microsoft.com/office/drawing/2017/decorative" val="1"/>
+                <adec:decorative xmlns:adec="http://schemas.microsoft.com/office/drawing/2017/decorative" xmlns="" val="1"/>
               </a:ext>
             </a:extLst>
           </p:cNvPr>
@@ -18846,7 +18843,7 @@
             <p:ph sz="half" idx="2"/>
             <p:extLst>
               <p:ext uri="{E7BDC344-281C-4309-B0C6-D0EE65EED2A8}">
-                <p202:designPr xmlns="" xmlns:p202="http://schemas.microsoft.com/office/powerpoint/2020/02/main">
+                <p202:designPr xmlns:p202="http://schemas.microsoft.com/office/powerpoint/2020/02/main" xmlns="">
                   <p202:designTagLst>
                     <p202:designTag name="ARCH:1:CLS" val="InformationBlock"/>
                     <p202:designTag name="ARCH:1:VSVAR" val="TitledTextBox"/>
@@ -19104,7 +19101,7 @@
                 <a16:creationId xmlns:a16="http://schemas.microsoft.com/office/drawing/2014/main" id="{7F39A533-5E9C-439F-5CF1-06FFAB778C1F}"/>
               </a:ext>
               <a:ext uri="{C183D7F6-B498-43B3-948B-1728B52AA6E4}">
-                <adec:decorative xmlns="" xmlns:adec="http://schemas.microsoft.com/office/drawing/2017/decorative" val="1"/>
+                <adec:decorative xmlns:adec="http://schemas.microsoft.com/office/drawing/2017/decorative" xmlns="" val="1"/>
               </a:ext>
             </a:extLst>
           </p:cNvPr>
@@ -19232,7 +19229,7 @@
             <p:ph sz="half" idx="2"/>
             <p:extLst>
               <p:ext uri="{E7BDC344-281C-4309-B0C6-D0EE65EED2A8}">
-                <p202:designPr xmlns="" xmlns:p202="http://schemas.microsoft.com/office/powerpoint/2020/02/main">
+                <p202:designPr xmlns:p202="http://schemas.microsoft.com/office/powerpoint/2020/02/main" xmlns="">
                   <p202:designTagLst>
                     <p202:designTag name="ARCH:1:CLS" val="InformationBlock"/>
                     <p202:designTag name="ARCH:1:VSVAR" val="TitledTextBox"/>
@@ -19505,7 +19502,7 @@
                 <a16:creationId xmlns:a16="http://schemas.microsoft.com/office/drawing/2014/main" id="{A82A2D76-411A-C189-4AD9-642686996848}"/>
               </a:ext>
               <a:ext uri="{C183D7F6-B498-43B3-948B-1728B52AA6E4}">
-                <adec:decorative xmlns="" xmlns:adec="http://schemas.microsoft.com/office/drawing/2017/decorative" val="1"/>
+                <adec:decorative xmlns:adec="http://schemas.microsoft.com/office/drawing/2017/decorative" xmlns="" val="1"/>
               </a:ext>
             </a:extLst>
           </p:cNvPr>
@@ -19633,7 +19630,7 @@
             <p:ph sz="half" idx="2"/>
             <p:extLst>
               <p:ext uri="{E7BDC344-281C-4309-B0C6-D0EE65EED2A8}">
-                <p202:designPr xmlns="" xmlns:p202="http://schemas.microsoft.com/office/powerpoint/2020/02/main">
+                <p202:designPr xmlns:p202="http://schemas.microsoft.com/office/powerpoint/2020/02/main" xmlns="">
                   <p202:designTagLst>
                     <p202:designTag name="ARCH:1:CLS" val="InformationBlock"/>
                     <p202:designTag name="ARCH:1:VSVAR" val="TitledTextBox"/>
@@ -19894,7 +19891,7 @@
                 <a16:creationId xmlns:a16="http://schemas.microsoft.com/office/drawing/2014/main" id="{E482AA53-DA69-E258-8B64-8F8CE86FCDD4}"/>
               </a:ext>
               <a:ext uri="{C183D7F6-B498-43B3-948B-1728B52AA6E4}">
-                <adec:decorative xmlns="" xmlns:adec="http://schemas.microsoft.com/office/drawing/2017/decorative" val="1"/>
+                <adec:decorative xmlns:adec="http://schemas.microsoft.com/office/drawing/2017/decorative" xmlns="" val="1"/>
               </a:ext>
             </a:extLst>
           </p:cNvPr>
@@ -20022,7 +20019,7 @@
             <p:ph sz="half" idx="2"/>
             <p:extLst>
               <p:ext uri="{E7BDC344-281C-4309-B0C6-D0EE65EED2A8}">
-                <p202:designPr xmlns="" xmlns:p202="http://schemas.microsoft.com/office/powerpoint/2020/02/main">
+                <p202:designPr xmlns:p202="http://schemas.microsoft.com/office/powerpoint/2020/02/main" xmlns="">
                   <p202:designTagLst>
                     <p202:designTag name="ARCH:1:CLS" val="InformationBlock"/>
                     <p202:designTag name="ARCH:1:VSVAR" val="TitledTextBox"/>
@@ -20298,7 +20295,7 @@
                 <a16:creationId xmlns:a16="http://schemas.microsoft.com/office/drawing/2014/main" id="{5C27E16A-554C-D4AC-900E-AA69DDAEDE03}"/>
               </a:ext>
               <a:ext uri="{C183D7F6-B498-43B3-948B-1728B52AA6E4}">
-                <adec:decorative xmlns="" xmlns:adec="http://schemas.microsoft.com/office/drawing/2017/decorative" val="1"/>
+                <adec:decorative xmlns:adec="http://schemas.microsoft.com/office/drawing/2017/decorative" xmlns="" val="1"/>
               </a:ext>
             </a:extLst>
           </p:cNvPr>
@@ -20426,7 +20423,7 @@
             <p:ph sz="half" idx="2"/>
             <p:extLst>
               <p:ext uri="{E7BDC344-281C-4309-B0C6-D0EE65EED2A8}">
-                <p202:designPr xmlns="" xmlns:p202="http://schemas.microsoft.com/office/powerpoint/2020/02/main">
+                <p202:designPr xmlns:p202="http://schemas.microsoft.com/office/powerpoint/2020/02/main" xmlns="">
                   <p202:designTagLst>
                     <p202:designTag name="ARCH:1:CLS" val="InformationBlock"/>
                     <p202:designTag name="ARCH:1:VSVAR" val="TitledTextBox"/>

</xml_diff>